<commit_message>
Fixed typos in 5507-02-simon-slides-and-speaker-notes.Rmd
</commit_message>
<xml_diff>
--- a/results/5507-01-simon-sildes-and-speaker-notes.pptx
+++ b/results/5507-01-simon-sildes-and-speaker-notes.pptx
@@ -1,6 +1,6 @@
 
 <file path=ppt/presentation.xml><?xml version="1.0" encoding="utf-8"?>
-<p:presentation xmlns:a="http://schemas.openxmlformats.org/drawingml/2006/main" xmlns:r="http://schemas.openxmlformats.org/officeDocument/2006/relationships" xmlns:p="http://schemas.openxmlformats.org/presentationml/2006/main" saveSubsetFonts="1" autoCompressPictures="0">
+<p:presentation xmlns:a="http://schemas.openxmlformats.org/drawingml/2006/main" xmlns:p="http://schemas.openxmlformats.org/presentationml/2006/main" xmlns:r="http://schemas.openxmlformats.org/officeDocument/2006/relationships" autoCompressPictures="0" saveSubsetFonts="1">
   <p:sldMasterIdLst>
     <p:sldMasterId id="2147483648" r:id="rId1"/>
   </p:sldMasterIdLst>
@@ -63,8 +63,8 @@
     <a:defPPr>
       <a:defRPr lang="en-US"/>
     </a:defPPr>
-    <a:lvl1pPr marL="0" algn="l" defTabSz="457200" rtl="0" eaLnBrk="1" latinLnBrk="0" hangingPunct="1">
-      <a:defRPr sz="1800" kern="1200">
+    <a:lvl1pPr algn="l" defTabSz="457200" eaLnBrk="1" hangingPunct="1" latinLnBrk="0" marL="0" rtl="0">
+      <a:defRPr kern="1200" sz="1800">
         <a:solidFill>
           <a:schemeClr val="tx1"/>
         </a:solidFill>
@@ -73,8 +73,8 @@
         <a:cs typeface="+mn-cs"/>
       </a:defRPr>
     </a:lvl1pPr>
-    <a:lvl2pPr marL="457200" algn="l" defTabSz="457200" rtl="0" eaLnBrk="1" latinLnBrk="0" hangingPunct="1">
-      <a:defRPr sz="1800" kern="1200">
+    <a:lvl2pPr algn="l" defTabSz="457200" eaLnBrk="1" hangingPunct="1" latinLnBrk="0" marL="457200" rtl="0">
+      <a:defRPr kern="1200" sz="1800">
         <a:solidFill>
           <a:schemeClr val="tx1"/>
         </a:solidFill>
@@ -83,8 +83,8 @@
         <a:cs typeface="+mn-cs"/>
       </a:defRPr>
     </a:lvl2pPr>
-    <a:lvl3pPr marL="914400" algn="l" defTabSz="457200" rtl="0" eaLnBrk="1" latinLnBrk="0" hangingPunct="1">
-      <a:defRPr sz="1800" kern="1200">
+    <a:lvl3pPr algn="l" defTabSz="457200" eaLnBrk="1" hangingPunct="1" latinLnBrk="0" marL="914400" rtl="0">
+      <a:defRPr kern="1200" sz="1800">
         <a:solidFill>
           <a:schemeClr val="tx1"/>
         </a:solidFill>
@@ -93,8 +93,8 @@
         <a:cs typeface="+mn-cs"/>
       </a:defRPr>
     </a:lvl3pPr>
-    <a:lvl4pPr marL="1371600" algn="l" defTabSz="457200" rtl="0" eaLnBrk="1" latinLnBrk="0" hangingPunct="1">
-      <a:defRPr sz="1800" kern="1200">
+    <a:lvl4pPr algn="l" defTabSz="457200" eaLnBrk="1" hangingPunct="1" latinLnBrk="0" marL="1371600" rtl="0">
+      <a:defRPr kern="1200" sz="1800">
         <a:solidFill>
           <a:schemeClr val="tx1"/>
         </a:solidFill>
@@ -103,8 +103,8 @@
         <a:cs typeface="+mn-cs"/>
       </a:defRPr>
     </a:lvl4pPr>
-    <a:lvl5pPr marL="1828800" algn="l" defTabSz="457200" rtl="0" eaLnBrk="1" latinLnBrk="0" hangingPunct="1">
-      <a:defRPr sz="1800" kern="1200">
+    <a:lvl5pPr algn="l" defTabSz="457200" eaLnBrk="1" hangingPunct="1" latinLnBrk="0" marL="1828800" rtl="0">
+      <a:defRPr kern="1200" sz="1800">
         <a:solidFill>
           <a:schemeClr val="tx1"/>
         </a:solidFill>
@@ -113,8 +113,8 @@
         <a:cs typeface="+mn-cs"/>
       </a:defRPr>
     </a:lvl5pPr>
-    <a:lvl6pPr marL="2286000" algn="l" defTabSz="457200" rtl="0" eaLnBrk="1" latinLnBrk="0" hangingPunct="1">
-      <a:defRPr sz="1800" kern="1200">
+    <a:lvl6pPr algn="l" defTabSz="457200" eaLnBrk="1" hangingPunct="1" latinLnBrk="0" marL="2286000" rtl="0">
+      <a:defRPr kern="1200" sz="1800">
         <a:solidFill>
           <a:schemeClr val="tx1"/>
         </a:solidFill>
@@ -123,8 +123,8 @@
         <a:cs typeface="+mn-cs"/>
       </a:defRPr>
     </a:lvl6pPr>
-    <a:lvl7pPr marL="2743200" algn="l" defTabSz="457200" rtl="0" eaLnBrk="1" latinLnBrk="0" hangingPunct="1">
-      <a:defRPr sz="1800" kern="1200">
+    <a:lvl7pPr algn="l" defTabSz="457200" eaLnBrk="1" hangingPunct="1" latinLnBrk="0" marL="2743200" rtl="0">
+      <a:defRPr kern="1200" sz="1800">
         <a:solidFill>
           <a:schemeClr val="tx1"/>
         </a:solidFill>
@@ -133,8 +133,8 @@
         <a:cs typeface="+mn-cs"/>
       </a:defRPr>
     </a:lvl7pPr>
-    <a:lvl8pPr marL="3200400" algn="l" defTabSz="457200" rtl="0" eaLnBrk="1" latinLnBrk="0" hangingPunct="1">
-      <a:defRPr sz="1800" kern="1200">
+    <a:lvl8pPr algn="l" defTabSz="457200" eaLnBrk="1" hangingPunct="1" latinLnBrk="0" marL="3200400" rtl="0">
+      <a:defRPr kern="1200" sz="1800">
         <a:solidFill>
           <a:schemeClr val="tx1"/>
         </a:solidFill>
@@ -143,8 +143,8 @@
         <a:cs typeface="+mn-cs"/>
       </a:defRPr>
     </a:lvl8pPr>
-    <a:lvl9pPr marL="3657600" algn="l" defTabSz="457200" rtl="0" eaLnBrk="1" latinLnBrk="0" hangingPunct="1">
-      <a:defRPr sz="1800" kern="1200">
+    <a:lvl9pPr algn="l" defTabSz="457200" eaLnBrk="1" hangingPunct="1" latinLnBrk="0" marL="3657600" rtl="0">
+      <a:defRPr kern="1200" sz="1800">
         <a:solidFill>
           <a:schemeClr val="tx1"/>
         </a:solidFill>
@@ -27314,7 +27314,7 @@
             <a:spLocks noGrp="1"/>
           </p:cNvSpPr>
           <p:nvPr>
-            <p:ph type="subTitle" idx="1"/>
+            <p:ph idx="1" type="subTitle"/>
           </p:nvPr>
         </p:nvSpPr>
         <p:spPr>
@@ -27354,7 +27354,7 @@
             <a:spLocks noGrp="1"/>
           </p:cNvSpPr>
           <p:nvPr>
-            <p:ph type="dt" sz="half" idx="10"/>
+            <p:ph idx="10" sz="half" type="dt"/>
           </p:nvPr>
         </p:nvSpPr>
         <p:spPr/>
@@ -28771,11 +28771,11 @@
           <a:bodyPr/>
           <a:lstStyle/>
           <a:p>
-            <a:pPr lvl="0" marL="1270000" indent="0">
+            <a:pPr lvl="0" indent="0">
               <a:buNone/>
             </a:pPr>
             <a:r>
-              <a:rPr sz="1800">
+              <a:rPr>
                 <a:latin typeface="Courier"/>
               </a:rPr>
               <a:t>data test_example;
@@ -29180,11 +29180,11 @@
           <a:bodyPr/>
           <a:lstStyle/>
           <a:p>
-            <a:pPr lvl="0" marL="1270000" indent="0">
+            <a:pPr lvl="0" indent="0">
               <a:buNone/>
             </a:pPr>
             <a:r>
-              <a:rPr sz="1800">
+              <a:rPr>
                 <a:latin typeface="Courier"/>
               </a:rPr>
               <a:t>1    data test_example;
@@ -29292,11 +29292,11 @@
           <a:bodyPr/>
           <a:lstStyle/>
           <a:p>
-            <a:pPr lvl="0" marL="1270000" indent="0">
+            <a:pPr lvl="0" indent="0">
               <a:buNone/>
             </a:pPr>
             <a:r>
-              <a:rPr sz="1800">
+              <a:rPr>
                 <a:latin typeface="Courier"/>
               </a:rPr>
               <a:t>9    proc means data=test_example;
@@ -30741,11 +30741,11 @@
           <a:bodyPr/>
           <a:lstStyle/>
           <a:p>
-            <a:pPr lvl="0" marL="1270000" indent="0">
+            <a:pPr lvl="0" indent="0">
               <a:buNone/>
             </a:pPr>
             <a:r>
-              <a:rPr sz="1800">
+              <a:rPr>
                 <a:latin typeface="Courier"/>
               </a:rPr>
               <a:t>data small_example;
@@ -30955,11 +30955,11 @@
           <a:bodyPr/>
           <a:lstStyle/>
           <a:p>
-            <a:pPr lvl="0" marL="1270000" indent="0">
+            <a:pPr lvl="0" indent="0">
               <a:buNone/>
             </a:pPr>
             <a:r>
-              <a:rPr sz="1800">
+              <a:rPr>
                 <a:latin typeface="Courier"/>
               </a:rPr>
               <a:t>* 5507-01-simon-permanent-storage.sas
@@ -31057,11 +31057,11 @@
           <a:bodyPr/>
           <a:lstStyle/>
           <a:p>
-            <a:pPr lvl="0" marL="1270000" indent="0">
+            <a:pPr lvl="0" indent="0">
               <a:buNone/>
             </a:pPr>
             <a:r>
-              <a:rPr sz="1800">
+              <a:rPr>
                 <a:latin typeface="Courier"/>
               </a:rPr>
               <a:t>%let path=q:/introduction-to-sas;
@@ -31163,11 +31163,11 @@
           <a:bodyPr/>
           <a:lstStyle/>
           <a:p>
-            <a:pPr lvl="0" marL="1270000" indent="0">
+            <a:pPr lvl="0" indent="0">
               <a:buNone/>
             </a:pPr>
             <a:r>
-              <a:rPr sz="1800">
+              <a:rPr>
                 <a:latin typeface="Courier"/>
               </a:rPr>
               <a:t>proc print
@@ -31288,11 +31288,11 @@
           <a:bodyPr/>
           <a:lstStyle/>
           <a:p>
-            <a:pPr lvl="0" marL="1270000" indent="0">
+            <a:pPr lvl="0" indent="0">
               <a:buNone/>
             </a:pPr>
             <a:r>
-              <a:rPr sz="1800">
+              <a:rPr>
                 <a:latin typeface="Courier"/>
               </a:rPr>
               <a:t>* 5507-01-simon-re-use.sas
@@ -31414,11 +31414,11 @@
           <a:bodyPr/>
           <a:lstStyle/>
           <a:p>
-            <a:pPr lvl="0" marL="1270000" indent="0">
+            <a:pPr lvl="0" indent="0">
               <a:buNone/>
             </a:pPr>
             <a:r>
-              <a:rPr sz="1800">
+              <a:rPr>
                 <a:latin typeface="Courier"/>
               </a:rPr>
               <a:t>%let path=q:/introduction-to-sas;
@@ -31787,11 +31787,11 @@
           <a:bodyPr/>
           <a:lstStyle/>
           <a:p>
-            <a:pPr lvl="0" marL="1270000" indent="0">
+            <a:pPr lvl="0" indent="0">
               <a:buNone/>
             </a:pPr>
             <a:r>
-              <a:rPr sz="1800">
+              <a:rPr>
                 <a:latin typeface="Courier"/>
               </a:rPr>
               <a:t>* 5507-01-simon-save-output.sas
@@ -31905,11 +31905,11 @@
           <a:bodyPr/>
           <a:lstStyle/>
           <a:p>
-            <a:pPr lvl="0" marL="1270000" indent="0">
+            <a:pPr lvl="0" indent="0">
               <a:buNone/>
             </a:pPr>
             <a:r>
-              <a:rPr sz="1800">
+              <a:rPr>
                 <a:latin typeface="Courier"/>
               </a:rPr>
               <a:t>%let path=q:/introduction-to-sas;
@@ -32029,11 +32029,11 @@
           <a:bodyPr/>
           <a:lstStyle/>
           <a:p>
-            <a:pPr lvl="0" marL="1270000" indent="0">
+            <a:pPr lvl="0" indent="0">
               <a:buNone/>
             </a:pPr>
             <a:r>
-              <a:rPr sz="1800">
+              <a:rPr>
                 <a:latin typeface="Courier"/>
               </a:rPr>
               <a:t>proc print
@@ -32254,11 +32254,11 @@
           <a:bodyPr/>
           <a:lstStyle/>
           <a:p>
-            <a:pPr lvl="0" marL="1270000" indent="0">
+            <a:pPr lvl="0" indent="0">
               <a:buNone/>
             </a:pPr>
             <a:r>
-              <a:rPr sz="1800">
+              <a:rPr>
                 <a:latin typeface="Courier"/>
               </a:rPr>
               <a:t>* 5507-01-simon-input-text.sas
@@ -32380,11 +32380,11 @@
           <a:bodyPr/>
           <a:lstStyle/>
           <a:p>
-            <a:pPr lvl="0" marL="1270000" indent="0">
+            <a:pPr lvl="0" indent="0">
               <a:buNone/>
             </a:pPr>
             <a:r>
-              <a:rPr sz="1800">
+              <a:rPr>
                 <a:latin typeface="Courier"/>
               </a:rPr>
               <a:t>%let path=q:/introduction-to-sas;
@@ -32509,11 +32509,11 @@
           <a:bodyPr/>
           <a:lstStyle/>
           <a:p>
-            <a:pPr lvl="0" marL="1270000" indent="0">
+            <a:pPr lvl="0" indent="0">
               <a:buNone/>
             </a:pPr>
             <a:r>
-              <a:rPr sz="1800">
+              <a:rPr>
                 <a:latin typeface="Courier"/>
               </a:rPr>
               <a:t>proc print
@@ -32635,11 +32635,11 @@
           <a:bodyPr/>
           <a:lstStyle/>
           <a:p>
-            <a:pPr lvl="0" marL="1270000" indent="0">
+            <a:pPr lvl="0" indent="0">
               <a:buNone/>
             </a:pPr>
             <a:r>
-              <a:rPr sz="1800">
+              <a:rPr>
                 <a:latin typeface="Courier"/>
               </a:rPr>
               <a:t>1 2

</xml_diff>

<commit_message>
Fixed typo in 5507-01-slides
</commit_message>
<xml_diff>
--- a/results/5507-01-simon-sildes-and-speaker-notes.pptx
+++ b/results/5507-01-simon-sildes-and-speaker-notes.pptx
@@ -1210,7 +1210,7 @@
             </a:r>
             <a:r>
               <a:rPr/>
-              <a:t>Powerpoint</a:t>
+              <a:t>PowerPoint</a:t>
             </a:r>
             <a:r>
               <a:rPr/>
@@ -1250,7 +1250,7 @@
             </a:r>
             <a:r>
               <a:rPr/>
-              <a:t>Powerpoint</a:t>
+              <a:t>PowerPoint</a:t>
             </a:r>
             <a:r>
               <a:rPr/>
@@ -2716,7 +2716,7 @@
             </a:r>
             <a:r>
               <a:rPr/>
-              <a:t>wih</a:t>
+              <a:t>with</a:t>
             </a:r>
             <a:r>
               <a:rPr/>
@@ -8086,7 +8086,7 @@
             </a:r>
             <a:r>
               <a:rPr/>
-              <a:t>imporant</a:t>
+              <a:t>important</a:t>
             </a:r>
             <a:r>
               <a:rPr/>
@@ -14998,7 +14998,7 @@
             </a:r>
             <a:r>
               <a:rPr/>
-              <a:t>friednly</a:t>
+              <a:t>friendly</a:t>
             </a:r>
             <a:r>
               <a:rPr/>
@@ -15054,7 +15054,7 @@
             </a:r>
             <a:r>
               <a:rPr/>
-              <a:t>Institure</a:t>
+              <a:t>Institute</a:t>
             </a:r>
             <a:r>
               <a:rPr/>
@@ -16080,7 +16080,7 @@
             </a:r>
             <a:r>
               <a:rPr/>
-              <a:t>credetials</a:t>
+              <a:t>credentials</a:t>
             </a:r>
             <a:r>
               <a:rPr/>
@@ -24172,7 +24172,7 @@
             </a:r>
             <a:r>
               <a:rPr/>
-              <a:t>donain,</a:t>
+              <a:t>domain,</a:t>
             </a:r>
             <a:r>
               <a:rPr/>
@@ -33552,7 +33552,7 @@
             </a:r>
             <a:r>
               <a:rPr/>
-              <a:t>demonstartion</a:t>
+              <a:t>demonstration</a:t>
             </a:r>
             <a:r>
               <a:rPr/>

</xml_diff>